<commit_message>
added outline for poster both in code and in ppt
</commit_message>
<xml_diff>
--- a/presentations/NeuroeconPoster2017.pptx
+++ b/presentations/NeuroeconPoster2017.pptx
@@ -112,7 +112,7 @@
   </p:defaultTextStyle>
   <p:extLst>
     <p:ext uri="{EFAFB233-063F-42B5-8137-9DF3F51BA10A}">
-      <p15:sldGuideLst xmlns="" xmlns:p15="http://schemas.microsoft.com/office/powerpoint/2012/main">
+      <p15:sldGuideLst xmlns:p15="http://schemas.microsoft.com/office/powerpoint/2012/main" xmlns="">
         <p15:guide id="1" orient="horz" pos="10368">
           <p15:clr>
             <a:srgbClr val="A4A3A4"/>
@@ -217,7 +217,7 @@
           <a:p>
             <a:fld id="{1ADD2877-6E47-914A-A562-5BB1D9253FFF}" type="datetimeFigureOut">
               <a:rPr lang="en-US" smtClean="0"/>
-              <a:t>9/19/17</a:t>
+              <a:t>10/2/17</a:t>
             </a:fld>
             <a:endParaRPr lang="en-US"/>
           </a:p>
@@ -383,7 +383,7 @@
             <a:fld id="{9C8C3FF2-16C4-3444-9527-EB6C5966600B}" type="datetimeFigureOut">
               <a:rPr lang="en-US" smtClean="0"/>
               <a:pPr/>
-              <a:t>9/19/17</a:t>
+              <a:t>10/2/17</a:t>
             </a:fld>
             <a:endParaRPr lang="en-US"/>
           </a:p>
@@ -1116,7 +1116,7 @@
             <a:fld id="{34EA0383-EA84-CF41-8911-55C3D60C640A}" type="datetimeFigureOut">
               <a:rPr lang="en-US" smtClean="0"/>
               <a:pPr/>
-              <a:t>9/19/17</a:t>
+              <a:t>10/2/17</a:t>
             </a:fld>
             <a:endParaRPr lang="en-US"/>
           </a:p>
@@ -1283,7 +1283,7 @@
             <a:fld id="{34EA0383-EA84-CF41-8911-55C3D60C640A}" type="datetimeFigureOut">
               <a:rPr lang="en-US" smtClean="0"/>
               <a:pPr/>
-              <a:t>9/19/17</a:t>
+              <a:t>10/2/17</a:t>
             </a:fld>
             <a:endParaRPr lang="en-US"/>
           </a:p>
@@ -1460,7 +1460,7 @@
             <a:fld id="{34EA0383-EA84-CF41-8911-55C3D60C640A}" type="datetimeFigureOut">
               <a:rPr lang="en-US" smtClean="0"/>
               <a:pPr/>
-              <a:t>9/19/17</a:t>
+              <a:t>10/2/17</a:t>
             </a:fld>
             <a:endParaRPr lang="en-US"/>
           </a:p>
@@ -1627,7 +1627,7 @@
             <a:fld id="{34EA0383-EA84-CF41-8911-55C3D60C640A}" type="datetimeFigureOut">
               <a:rPr lang="en-US" smtClean="0"/>
               <a:pPr/>
-              <a:t>9/19/17</a:t>
+              <a:t>10/2/17</a:t>
             </a:fld>
             <a:endParaRPr lang="en-US"/>
           </a:p>
@@ -1870,7 +1870,7 @@
             <a:fld id="{34EA0383-EA84-CF41-8911-55C3D60C640A}" type="datetimeFigureOut">
               <a:rPr lang="en-US" smtClean="0"/>
               <a:pPr/>
-              <a:t>9/19/17</a:t>
+              <a:t>10/2/17</a:t>
             </a:fld>
             <a:endParaRPr lang="en-US"/>
           </a:p>
@@ -2155,7 +2155,7 @@
             <a:fld id="{34EA0383-EA84-CF41-8911-55C3D60C640A}" type="datetimeFigureOut">
               <a:rPr lang="en-US" smtClean="0"/>
               <a:pPr/>
-              <a:t>9/19/17</a:t>
+              <a:t>10/2/17</a:t>
             </a:fld>
             <a:endParaRPr lang="en-US"/>
           </a:p>
@@ -2579,7 +2579,7 @@
             <a:fld id="{34EA0383-EA84-CF41-8911-55C3D60C640A}" type="datetimeFigureOut">
               <a:rPr lang="en-US" smtClean="0"/>
               <a:pPr/>
-              <a:t>9/19/17</a:t>
+              <a:t>10/2/17</a:t>
             </a:fld>
             <a:endParaRPr lang="en-US"/>
           </a:p>
@@ -2694,7 +2694,7 @@
             <a:fld id="{34EA0383-EA84-CF41-8911-55C3D60C640A}" type="datetimeFigureOut">
               <a:rPr lang="en-US" smtClean="0"/>
               <a:pPr/>
-              <a:t>9/19/17</a:t>
+              <a:t>10/2/17</a:t>
             </a:fld>
             <a:endParaRPr lang="en-US"/>
           </a:p>
@@ -2786,7 +2786,7 @@
             <a:fld id="{34EA0383-EA84-CF41-8911-55C3D60C640A}" type="datetimeFigureOut">
               <a:rPr lang="en-US" smtClean="0"/>
               <a:pPr/>
-              <a:t>9/19/17</a:t>
+              <a:t>10/2/17</a:t>
             </a:fld>
             <a:endParaRPr lang="en-US"/>
           </a:p>
@@ -3060,7 +3060,7 @@
             <a:fld id="{34EA0383-EA84-CF41-8911-55C3D60C640A}" type="datetimeFigureOut">
               <a:rPr lang="en-US" smtClean="0"/>
               <a:pPr/>
-              <a:t>9/19/17</a:t>
+              <a:t>10/2/17</a:t>
             </a:fld>
             <a:endParaRPr lang="en-US"/>
           </a:p>
@@ -3310,7 +3310,7 @@
             <a:fld id="{34EA0383-EA84-CF41-8911-55C3D60C640A}" type="datetimeFigureOut">
               <a:rPr lang="en-US" smtClean="0"/>
               <a:pPr/>
-              <a:t>9/19/17</a:t>
+              <a:t>10/2/17</a:t>
             </a:fld>
             <a:endParaRPr lang="en-US"/>
           </a:p>
@@ -3520,7 +3520,7 @@
             <a:fld id="{34EA0383-EA84-CF41-8911-55C3D60C640A}" type="datetimeFigureOut">
               <a:rPr lang="en-US" smtClean="0"/>
               <a:pPr/>
-              <a:t>9/19/17</a:t>
+              <a:t>10/2/17</a:t>
             </a:fld>
             <a:endParaRPr lang="en-US"/>
           </a:p>
@@ -3983,14 +3983,7 @@
                 <a:latin typeface="Arial"/>
                 <a:cs typeface="Arial"/>
               </a:rPr>
-              <a:t>Z. </a:t>
-            </a:r>
-            <a:r>
-              <a:rPr lang="en-US" sz="6000" dirty="0" smtClean="0">
-                <a:latin typeface="Arial"/>
-                <a:cs typeface="Arial"/>
-              </a:rPr>
-              <a:t>Enkavi</a:t>
+              <a:t>Z. Enkavi</a:t>
             </a:r>
             <a:r>
               <a:rPr lang="en-US" sz="6000" baseline="30000" dirty="0" smtClean="0">
@@ -4135,19 +4128,7 @@
                 <a:latin typeface="Arial"/>
                 <a:cs typeface="Arial"/>
               </a:rPr>
-              <a:t>Department of Psychology, Arizona State </a:t>
-            </a:r>
-            <a:r>
-              <a:rPr lang="en-US" sz="4200" dirty="0" smtClean="0">
-                <a:solidFill>
-                  <a:schemeClr val="bg1">
-                    <a:lumMod val="50000"/>
-                  </a:schemeClr>
-                </a:solidFill>
-                <a:latin typeface="Arial"/>
-                <a:cs typeface="Arial"/>
-              </a:rPr>
-              <a:t>University, </a:t>
+              <a:t>Department of Psychology, Arizona State University, </a:t>
             </a:r>
             <a:r>
               <a:rPr lang="en-US" sz="4200" baseline="30000" dirty="0" smtClean="0">
@@ -4776,14 +4757,14 @@
               </a:spcBef>
             </a:pPr>
             <a:r>
-              <a:rPr lang="en-US" sz="5000" b="1" dirty="0">
+              <a:rPr lang="en-US" sz="5000" b="1" dirty="0" smtClean="0">
                 <a:solidFill>
                   <a:schemeClr val="bg1"/>
                 </a:solidFill>
                 <a:latin typeface="Arial"/>
                 <a:cs typeface="Arial"/>
               </a:rPr>
-              <a:t>Results</a:t>
+              <a:t>Our results</a:t>
             </a:r>
             <a:endParaRPr lang="en-US" sz="5000" dirty="0">
               <a:solidFill>
@@ -5018,7 +4999,7 @@
                 <a:latin typeface="Arial"/>
                 <a:cs typeface="Arial"/>
               </a:rPr>
-              <a:t>Methods</a:t>
+              <a:t>Literature review</a:t>
             </a:r>
             <a:endParaRPr lang="en-US" sz="5000" dirty="0">
               <a:solidFill>
@@ -5060,6 +5041,552 @@
           </a:prstGeom>
         </p:spPr>
       </p:pic>
+      <p:sp>
+        <p:nvSpPr>
+          <p:cNvPr id="20" name="Text Box 424"/>
+          <p:cNvSpPr txBox="1">
+            <a:spLocks noChangeArrowheads="1"/>
+          </p:cNvSpPr>
+          <p:nvPr/>
+        </p:nvSpPr>
+        <p:spPr bwMode="auto">
+          <a:xfrm>
+            <a:off x="471431" y="22559334"/>
+            <a:ext cx="9769848" cy="844173"/>
+          </a:xfrm>
+          <a:prstGeom prst="rect">
+            <a:avLst/>
+          </a:prstGeom>
+          <a:solidFill>
+            <a:srgbClr val="A40A1D"/>
+          </a:solidFill>
+          <a:ln w="25400">
+            <a:noFill/>
+            <a:miter lim="800000"/>
+            <a:headEnd/>
+            <a:tailEnd/>
+          </a:ln>
+          <a:effectLst/>
+        </p:spPr>
+        <p:txBody>
+          <a:bodyPr wrap="square" lIns="79230" tIns="39614" rIns="79230" bIns="39614">
+            <a:prstTxWarp prst="textNoShape">
+              <a:avLst/>
+            </a:prstTxWarp>
+            <a:spAutoFit/>
+          </a:bodyPr>
+          <a:lstStyle/>
+          <a:p>
+            <a:pPr algn="ctr">
+              <a:spcBef>
+                <a:spcPct val="50000"/>
+              </a:spcBef>
+            </a:pPr>
+            <a:r>
+              <a:rPr lang="en-US" sz="5000" b="1" dirty="0" smtClean="0">
+                <a:solidFill>
+                  <a:schemeClr val="bg1"/>
+                </a:solidFill>
+                <a:latin typeface="Arial"/>
+                <a:cs typeface="Arial"/>
+              </a:rPr>
+              <a:t>Methods</a:t>
+            </a:r>
+            <a:endParaRPr lang="en-US" sz="5000" dirty="0">
+              <a:solidFill>
+                <a:schemeClr val="bg1"/>
+              </a:solidFill>
+              <a:latin typeface="Arial"/>
+              <a:cs typeface="Arial"/>
+            </a:endParaRPr>
+          </a:p>
+        </p:txBody>
+      </p:sp>
+      <p:sp>
+        <p:nvSpPr>
+          <p:cNvPr id="6" name="Rectangle 5"/>
+          <p:cNvSpPr/>
+          <p:nvPr/>
+        </p:nvSpPr>
+        <p:spPr>
+          <a:xfrm>
+            <a:off x="11311580" y="6587648"/>
+            <a:ext cx="15179936" cy="6230487"/>
+          </a:xfrm>
+          <a:prstGeom prst="rect">
+            <a:avLst/>
+          </a:prstGeom>
+          <a:solidFill>
+            <a:schemeClr val="accent3"/>
+          </a:solidFill>
+          <a:ln>
+            <a:solidFill>
+              <a:schemeClr val="tx1"/>
+            </a:solidFill>
+          </a:ln>
+          <a:effectLst/>
+        </p:spPr>
+        <p:style>
+          <a:lnRef idx="1">
+            <a:schemeClr val="accent1"/>
+          </a:lnRef>
+          <a:fillRef idx="3">
+            <a:schemeClr val="accent1"/>
+          </a:fillRef>
+          <a:effectRef idx="2">
+            <a:schemeClr val="accent1"/>
+          </a:effectRef>
+          <a:fontRef idx="minor">
+            <a:schemeClr val="lt1"/>
+          </a:fontRef>
+        </p:style>
+        <p:txBody>
+          <a:bodyPr rtlCol="0" anchor="ctr"/>
+          <a:lstStyle/>
+          <a:p>
+            <a:pPr algn="ctr"/>
+            <a:r>
+              <a:rPr lang="en-US" dirty="0" smtClean="0"/>
+              <a:t>Lit review figure</a:t>
+            </a:r>
+            <a:endParaRPr lang="en-US" dirty="0"/>
+          </a:p>
+        </p:txBody>
+      </p:sp>
+      <p:sp>
+        <p:nvSpPr>
+          <p:cNvPr id="24" name="Rectangle 23"/>
+          <p:cNvSpPr/>
+          <p:nvPr/>
+        </p:nvSpPr>
+        <p:spPr>
+          <a:xfrm>
+            <a:off x="11311580" y="14530502"/>
+            <a:ext cx="15179936" cy="6230487"/>
+          </a:xfrm>
+          <a:prstGeom prst="rect">
+            <a:avLst/>
+          </a:prstGeom>
+          <a:solidFill>
+            <a:schemeClr val="accent3"/>
+          </a:solidFill>
+          <a:ln>
+            <a:solidFill>
+              <a:schemeClr val="tx1"/>
+            </a:solidFill>
+          </a:ln>
+          <a:effectLst/>
+        </p:spPr>
+        <p:style>
+          <a:lnRef idx="1">
+            <a:schemeClr val="accent1"/>
+          </a:lnRef>
+          <a:fillRef idx="3">
+            <a:schemeClr val="accent1"/>
+          </a:fillRef>
+          <a:effectRef idx="2">
+            <a:schemeClr val="accent1"/>
+          </a:effectRef>
+          <a:fontRef idx="minor">
+            <a:schemeClr val="lt1"/>
+          </a:fontRef>
+        </p:style>
+        <p:txBody>
+          <a:bodyPr rtlCol="0" anchor="ctr"/>
+          <a:lstStyle/>
+          <a:p>
+            <a:pPr algn="ctr"/>
+            <a:r>
+              <a:rPr lang="en-US" dirty="0" smtClean="0"/>
+              <a:t>Bootstrapped reliabilities figure</a:t>
+            </a:r>
+            <a:endParaRPr lang="en-US" dirty="0"/>
+          </a:p>
+        </p:txBody>
+      </p:sp>
+      <p:sp>
+        <p:nvSpPr>
+          <p:cNvPr id="25" name="Rectangle 24"/>
+          <p:cNvSpPr/>
+          <p:nvPr/>
+        </p:nvSpPr>
+        <p:spPr>
+          <a:xfrm>
+            <a:off x="11311580" y="21270550"/>
+            <a:ext cx="4553057" cy="4127613"/>
+          </a:xfrm>
+          <a:prstGeom prst="rect">
+            <a:avLst/>
+          </a:prstGeom>
+          <a:solidFill>
+            <a:schemeClr val="accent3"/>
+          </a:solidFill>
+          <a:ln>
+            <a:solidFill>
+              <a:schemeClr val="tx1"/>
+            </a:solidFill>
+          </a:ln>
+          <a:effectLst/>
+        </p:spPr>
+        <p:style>
+          <a:lnRef idx="1">
+            <a:schemeClr val="accent1"/>
+          </a:lnRef>
+          <a:fillRef idx="3">
+            <a:schemeClr val="accent1"/>
+          </a:fillRef>
+          <a:effectRef idx="2">
+            <a:schemeClr val="accent1"/>
+          </a:effectRef>
+          <a:fontRef idx="minor">
+            <a:schemeClr val="lt1"/>
+          </a:fontRef>
+        </p:style>
+        <p:txBody>
+          <a:bodyPr rtlCol="0" anchor="ctr"/>
+          <a:lstStyle/>
+          <a:p>
+            <a:pPr algn="ctr"/>
+            <a:r>
+              <a:rPr lang="en-US" dirty="0" smtClean="0"/>
+              <a:t>Histogram of tasks </a:t>
+            </a:r>
+            <a:r>
+              <a:rPr lang="en-US" dirty="0" err="1" smtClean="0"/>
+              <a:t>vs</a:t>
+            </a:r>
+            <a:r>
+              <a:rPr lang="en-US" dirty="0" smtClean="0"/>
+              <a:t> surveys</a:t>
+            </a:r>
+            <a:endParaRPr lang="en-US" dirty="0"/>
+          </a:p>
+        </p:txBody>
+      </p:sp>
+      <p:sp>
+        <p:nvSpPr>
+          <p:cNvPr id="26" name="Rectangle 25"/>
+          <p:cNvSpPr/>
+          <p:nvPr/>
+        </p:nvSpPr>
+        <p:spPr>
+          <a:xfrm>
+            <a:off x="16375664" y="21270550"/>
+            <a:ext cx="10115852" cy="4127613"/>
+          </a:xfrm>
+          <a:prstGeom prst="rect">
+            <a:avLst/>
+          </a:prstGeom>
+          <a:solidFill>
+            <a:schemeClr val="accent3"/>
+          </a:solidFill>
+          <a:ln>
+            <a:solidFill>
+              <a:schemeClr val="tx1"/>
+            </a:solidFill>
+          </a:ln>
+          <a:effectLst/>
+        </p:spPr>
+        <p:style>
+          <a:lnRef idx="1">
+            <a:schemeClr val="accent1"/>
+          </a:lnRef>
+          <a:fillRef idx="3">
+            <a:schemeClr val="accent1"/>
+          </a:fillRef>
+          <a:effectRef idx="2">
+            <a:schemeClr val="accent1"/>
+          </a:effectRef>
+          <a:fontRef idx="minor">
+            <a:schemeClr val="lt1"/>
+          </a:fontRef>
+        </p:style>
+        <p:txBody>
+          <a:bodyPr rtlCol="0" anchor="ctr"/>
+          <a:lstStyle/>
+          <a:p>
+            <a:pPr algn="ctr"/>
+            <a:r>
+              <a:rPr lang="en-US" dirty="0" smtClean="0"/>
+              <a:t>Text on stats</a:t>
+            </a:r>
+            <a:endParaRPr lang="en-US" dirty="0"/>
+          </a:p>
+        </p:txBody>
+      </p:sp>
+      <p:sp>
+        <p:nvSpPr>
+          <p:cNvPr id="27" name="Text Box 424"/>
+          <p:cNvSpPr txBox="1">
+            <a:spLocks noChangeArrowheads="1"/>
+          </p:cNvSpPr>
+          <p:nvPr/>
+        </p:nvSpPr>
+        <p:spPr bwMode="auto">
+          <a:xfrm>
+            <a:off x="28163522" y="5381667"/>
+            <a:ext cx="9769848" cy="844173"/>
+          </a:xfrm>
+          <a:prstGeom prst="rect">
+            <a:avLst/>
+          </a:prstGeom>
+          <a:solidFill>
+            <a:srgbClr val="A40A1D"/>
+          </a:solidFill>
+          <a:ln w="25400">
+            <a:noFill/>
+            <a:miter lim="800000"/>
+            <a:headEnd/>
+            <a:tailEnd/>
+          </a:ln>
+          <a:effectLst/>
+        </p:spPr>
+        <p:txBody>
+          <a:bodyPr wrap="square" lIns="79230" tIns="39614" rIns="79230" bIns="39614">
+            <a:prstTxWarp prst="textNoShape">
+              <a:avLst/>
+            </a:prstTxWarp>
+            <a:spAutoFit/>
+          </a:bodyPr>
+          <a:lstStyle/>
+          <a:p>
+            <a:pPr algn="ctr">
+              <a:spcBef>
+                <a:spcPct val="50000"/>
+              </a:spcBef>
+            </a:pPr>
+            <a:r>
+              <a:rPr lang="en-US" sz="5000" b="1" dirty="0" smtClean="0">
+                <a:solidFill>
+                  <a:schemeClr val="bg1"/>
+                </a:solidFill>
+                <a:latin typeface="Arial"/>
+                <a:cs typeface="Arial"/>
+              </a:rPr>
+              <a:t>Exploratory analyses</a:t>
+            </a:r>
+            <a:endParaRPr lang="en-US" sz="5000" dirty="0">
+              <a:solidFill>
+                <a:schemeClr val="bg1"/>
+              </a:solidFill>
+              <a:latin typeface="Arial"/>
+              <a:cs typeface="Arial"/>
+            </a:endParaRPr>
+          </a:p>
+        </p:txBody>
+      </p:sp>
+      <p:sp>
+        <p:nvSpPr>
+          <p:cNvPr id="28" name="Rectangle 27"/>
+          <p:cNvSpPr/>
+          <p:nvPr/>
+        </p:nvSpPr>
+        <p:spPr>
+          <a:xfrm>
+            <a:off x="11311581" y="25868876"/>
+            <a:ext cx="7461674" cy="5995148"/>
+          </a:xfrm>
+          <a:prstGeom prst="rect">
+            <a:avLst/>
+          </a:prstGeom>
+          <a:solidFill>
+            <a:schemeClr val="accent3"/>
+          </a:solidFill>
+          <a:ln>
+            <a:solidFill>
+              <a:schemeClr val="tx1"/>
+            </a:solidFill>
+          </a:ln>
+          <a:effectLst/>
+        </p:spPr>
+        <p:style>
+          <a:lnRef idx="1">
+            <a:schemeClr val="accent1"/>
+          </a:lnRef>
+          <a:fillRef idx="3">
+            <a:schemeClr val="accent1"/>
+          </a:fillRef>
+          <a:effectRef idx="2">
+            <a:schemeClr val="accent1"/>
+          </a:effectRef>
+          <a:fontRef idx="minor">
+            <a:schemeClr val="lt1"/>
+          </a:fontRef>
+        </p:style>
+        <p:txBody>
+          <a:bodyPr rtlCol="0" anchor="ctr"/>
+          <a:lstStyle/>
+          <a:p>
+            <a:pPr algn="ctr"/>
+            <a:r>
+              <a:rPr lang="en-US" dirty="0" smtClean="0"/>
+              <a:t>Table of reliabilities by survey name</a:t>
+            </a:r>
+            <a:endParaRPr lang="en-US" dirty="0"/>
+          </a:p>
+        </p:txBody>
+      </p:sp>
+      <p:sp>
+        <p:nvSpPr>
+          <p:cNvPr id="30" name="Rectangle 29"/>
+          <p:cNvSpPr/>
+          <p:nvPr/>
+        </p:nvSpPr>
+        <p:spPr>
+          <a:xfrm>
+            <a:off x="19362242" y="25868876"/>
+            <a:ext cx="7461674" cy="5995148"/>
+          </a:xfrm>
+          <a:prstGeom prst="rect">
+            <a:avLst/>
+          </a:prstGeom>
+          <a:solidFill>
+            <a:schemeClr val="accent3"/>
+          </a:solidFill>
+          <a:ln>
+            <a:solidFill>
+              <a:schemeClr val="tx1"/>
+            </a:solidFill>
+          </a:ln>
+          <a:effectLst/>
+        </p:spPr>
+        <p:style>
+          <a:lnRef idx="1">
+            <a:schemeClr val="accent1"/>
+          </a:lnRef>
+          <a:fillRef idx="3">
+            <a:schemeClr val="accent1"/>
+          </a:fillRef>
+          <a:effectRef idx="2">
+            <a:schemeClr val="accent1"/>
+          </a:effectRef>
+          <a:fontRef idx="minor">
+            <a:schemeClr val="lt1"/>
+          </a:fontRef>
+        </p:style>
+        <p:txBody>
+          <a:bodyPr rtlCol="0" anchor="ctr"/>
+          <a:lstStyle/>
+          <a:p>
+            <a:pPr algn="ctr"/>
+            <a:r>
+              <a:rPr lang="en-US" dirty="0" smtClean="0"/>
+              <a:t>Table of reliabilities by task name</a:t>
+            </a:r>
+            <a:endParaRPr lang="en-US" dirty="0"/>
+          </a:p>
+        </p:txBody>
+      </p:sp>
+      <p:sp>
+        <p:nvSpPr>
+          <p:cNvPr id="31" name="Rectangle 30"/>
+          <p:cNvSpPr/>
+          <p:nvPr/>
+        </p:nvSpPr>
+        <p:spPr>
+          <a:xfrm>
+            <a:off x="28524217" y="6587648"/>
+            <a:ext cx="6720286" cy="4563733"/>
+          </a:xfrm>
+          <a:prstGeom prst="rect">
+            <a:avLst/>
+          </a:prstGeom>
+          <a:solidFill>
+            <a:schemeClr val="accent3"/>
+          </a:solidFill>
+          <a:ln>
+            <a:solidFill>
+              <a:schemeClr val="tx1"/>
+            </a:solidFill>
+          </a:ln>
+          <a:effectLst/>
+        </p:spPr>
+        <p:style>
+          <a:lnRef idx="1">
+            <a:schemeClr val="accent1"/>
+          </a:lnRef>
+          <a:fillRef idx="3">
+            <a:schemeClr val="accent1"/>
+          </a:fillRef>
+          <a:effectRef idx="2">
+            <a:schemeClr val="accent1"/>
+          </a:effectRef>
+          <a:fontRef idx="minor">
+            <a:schemeClr val="lt1"/>
+          </a:fontRef>
+        </p:style>
+        <p:txBody>
+          <a:bodyPr rtlCol="0" anchor="ctr"/>
+          <a:lstStyle/>
+          <a:p>
+            <a:pPr algn="ctr"/>
+            <a:r>
+              <a:rPr lang="en-US" dirty="0" smtClean="0"/>
+              <a:t>Table of reliabilities by cognitive constructs</a:t>
+            </a:r>
+            <a:endParaRPr lang="en-US" dirty="0"/>
+          </a:p>
+        </p:txBody>
+      </p:sp>
+      <p:sp>
+        <p:nvSpPr>
+          <p:cNvPr id="32" name="Rectangle 31"/>
+          <p:cNvSpPr/>
+          <p:nvPr/>
+        </p:nvSpPr>
+        <p:spPr>
+          <a:xfrm>
+            <a:off x="28524217" y="11958556"/>
+            <a:ext cx="6720286" cy="4563733"/>
+          </a:xfrm>
+          <a:prstGeom prst="rect">
+            <a:avLst/>
+          </a:prstGeom>
+          <a:solidFill>
+            <a:schemeClr val="accent3"/>
+          </a:solidFill>
+          <a:ln>
+            <a:solidFill>
+              <a:schemeClr val="tx1"/>
+            </a:solidFill>
+          </a:ln>
+          <a:effectLst/>
+        </p:spPr>
+        <p:style>
+          <a:lnRef idx="1">
+            <a:schemeClr val="accent1"/>
+          </a:lnRef>
+          <a:fillRef idx="3">
+            <a:schemeClr val="accent1"/>
+          </a:fillRef>
+          <a:effectRef idx="2">
+            <a:schemeClr val="accent1"/>
+          </a:effectRef>
+          <a:fontRef idx="minor">
+            <a:schemeClr val="lt1"/>
+          </a:fontRef>
+        </p:style>
+        <p:txBody>
+          <a:bodyPr rtlCol="0" anchor="ctr"/>
+          <a:lstStyle/>
+          <a:p>
+            <a:pPr algn="ctr"/>
+            <a:r>
+              <a:rPr lang="en-US" dirty="0" smtClean="0"/>
+              <a:t>Histogram of DDM </a:t>
+            </a:r>
+            <a:r>
+              <a:rPr lang="en-US" dirty="0" err="1" smtClean="0"/>
+              <a:t>vs</a:t>
+            </a:r>
+            <a:r>
+              <a:rPr lang="en-US" dirty="0" smtClean="0"/>
+              <a:t> raw</a:t>
+            </a:r>
+            <a:endParaRPr lang="en-US" dirty="0"/>
+          </a:p>
+        </p:txBody>
+      </p:sp>
     </p:spTree>
   </p:cSld>
   <p:clrMapOvr>

</xml_diff>